<commit_message>
1DES lima aula01 add
</commit_message>
<xml_diff>
--- a/1des/lima/aula01/IntroducaoMarcacao.pptx
+++ b/1des/lima/aula01/IntroducaoMarcacao.pptx
@@ -12,8 +12,9 @@
     <p:sldId id="260" r:id="rId6"/>
     <p:sldId id="261" r:id="rId7"/>
     <p:sldId id="262" r:id="rId8"/>
-    <p:sldId id="263" r:id="rId9"/>
-    <p:sldId id="264" r:id="rId10"/>
+    <p:sldId id="264" r:id="rId9"/>
+    <p:sldId id="265" r:id="rId10"/>
+    <p:sldId id="263" r:id="rId11"/>
   </p:sldIdLst>
   <p:sldSz cx="12192000" cy="6858000"/>
   <p:notesSz cx="6858000" cy="9144000"/>
@@ -112,6 +113,11 @@
       </a:defRPr>
     </a:lvl9pPr>
   </p:defaultTextStyle>
+  <p:extLst>
+    <p:ext uri="{EFAFB233-063F-42B5-8137-9DF3F51BA10A}">
+      <p15:sldGuideLst xmlns:p15="http://schemas.microsoft.com/office/powerpoint/2012/main"/>
+    </p:ext>
+  </p:extLst>
 </p:presentation>
 </file>
 
@@ -389,7 +395,7 @@
           <a:p>
             <a:fld id="{4D55B308-DE3B-4AC4-B985-2D82C56D7FF1}" type="datetimeFigureOut">
               <a:rPr lang="pt-BR" smtClean="0"/>
-              <a:t>16/02/2021</a:t>
+              <a:t>17/02/2021</a:t>
             </a:fld>
             <a:endParaRPr lang="pt-BR"/>
           </a:p>
@@ -803,7 +809,7 @@
           <a:p>
             <a:fld id="{4D55B308-DE3B-4AC4-B985-2D82C56D7FF1}" type="datetimeFigureOut">
               <a:rPr lang="pt-BR" smtClean="0"/>
-              <a:t>16/02/2021</a:t>
+              <a:t>17/02/2021</a:t>
             </a:fld>
             <a:endParaRPr lang="pt-BR"/>
           </a:p>
@@ -1139,7 +1145,7 @@
           <a:p>
             <a:fld id="{4D55B308-DE3B-4AC4-B985-2D82C56D7FF1}" type="datetimeFigureOut">
               <a:rPr lang="pt-BR" smtClean="0"/>
-              <a:t>16/02/2021</a:t>
+              <a:t>17/02/2021</a:t>
             </a:fld>
             <a:endParaRPr lang="pt-BR"/>
           </a:p>
@@ -1544,7 +1550,7 @@
           <a:p>
             <a:fld id="{4D55B308-DE3B-4AC4-B985-2D82C56D7FF1}" type="datetimeFigureOut">
               <a:rPr lang="pt-BR" smtClean="0"/>
-              <a:t>16/02/2021</a:t>
+              <a:t>17/02/2021</a:t>
             </a:fld>
             <a:endParaRPr lang="pt-BR"/>
           </a:p>
@@ -2112,7 +2118,7 @@
           <a:p>
             <a:fld id="{4D55B308-DE3B-4AC4-B985-2D82C56D7FF1}" type="datetimeFigureOut">
               <a:rPr lang="pt-BR" smtClean="0"/>
-              <a:t>16/02/2021</a:t>
+              <a:t>17/02/2021</a:t>
             </a:fld>
             <a:endParaRPr lang="pt-BR"/>
           </a:p>
@@ -2793,7 +2799,7 @@
           <a:p>
             <a:fld id="{4D55B308-DE3B-4AC4-B985-2D82C56D7FF1}" type="datetimeFigureOut">
               <a:rPr lang="pt-BR" smtClean="0"/>
-              <a:t>16/02/2021</a:t>
+              <a:t>17/02/2021</a:t>
             </a:fld>
             <a:endParaRPr lang="pt-BR"/>
           </a:p>
@@ -3706,7 +3712,7 @@
           <a:p>
             <a:fld id="{4D55B308-DE3B-4AC4-B985-2D82C56D7FF1}" type="datetimeFigureOut">
               <a:rPr lang="pt-BR" smtClean="0"/>
-              <a:t>16/02/2021</a:t>
+              <a:t>17/02/2021</a:t>
             </a:fld>
             <a:endParaRPr lang="pt-BR"/>
           </a:p>
@@ -4019,7 +4025,7 @@
           <a:p>
             <a:fld id="{4D55B308-DE3B-4AC4-B985-2D82C56D7FF1}" type="datetimeFigureOut">
               <a:rPr lang="pt-BR" smtClean="0"/>
-              <a:t>16/02/2021</a:t>
+              <a:t>17/02/2021</a:t>
             </a:fld>
             <a:endParaRPr lang="pt-BR"/>
           </a:p>
@@ -4283,7 +4289,7 @@
           <a:p>
             <a:fld id="{4D55B308-DE3B-4AC4-B985-2D82C56D7FF1}" type="datetimeFigureOut">
               <a:rPr lang="pt-BR" smtClean="0"/>
-              <a:t>16/02/2021</a:t>
+              <a:t>17/02/2021</a:t>
             </a:fld>
             <a:endParaRPr lang="pt-BR"/>
           </a:p>
@@ -4606,7 +4612,7 @@
           <a:p>
             <a:fld id="{4D55B308-DE3B-4AC4-B985-2D82C56D7FF1}" type="datetimeFigureOut">
               <a:rPr lang="pt-BR" smtClean="0"/>
-              <a:t>16/02/2021</a:t>
+              <a:t>17/02/2021</a:t>
             </a:fld>
             <a:endParaRPr lang="pt-BR"/>
           </a:p>
@@ -4995,7 +5001,7 @@
           <a:p>
             <a:fld id="{4D55B308-DE3B-4AC4-B985-2D82C56D7FF1}" type="datetimeFigureOut">
               <a:rPr lang="pt-BR" smtClean="0"/>
-              <a:t>16/02/2021</a:t>
+              <a:t>17/02/2021</a:t>
             </a:fld>
             <a:endParaRPr lang="pt-BR"/>
           </a:p>
@@ -5371,7 +5377,7 @@
           <a:p>
             <a:fld id="{4D55B308-DE3B-4AC4-B985-2D82C56D7FF1}" type="datetimeFigureOut">
               <a:rPr lang="pt-BR" smtClean="0"/>
-              <a:t>16/02/2021</a:t>
+              <a:t>17/02/2021</a:t>
             </a:fld>
             <a:endParaRPr lang="pt-BR"/>
           </a:p>
@@ -5877,7 +5883,7 @@
           <a:p>
             <a:fld id="{4D55B308-DE3B-4AC4-B985-2D82C56D7FF1}" type="datetimeFigureOut">
               <a:rPr lang="pt-BR" smtClean="0"/>
-              <a:t>16/02/2021</a:t>
+              <a:t>17/02/2021</a:t>
             </a:fld>
             <a:endParaRPr lang="pt-BR"/>
           </a:p>
@@ -6134,7 +6140,7 @@
           <a:p>
             <a:fld id="{4D55B308-DE3B-4AC4-B985-2D82C56D7FF1}" type="datetimeFigureOut">
               <a:rPr lang="pt-BR" smtClean="0"/>
-              <a:t>16/02/2021</a:t>
+              <a:t>17/02/2021</a:t>
             </a:fld>
             <a:endParaRPr lang="pt-BR"/>
           </a:p>
@@ -6297,7 +6303,7 @@
           <a:p>
             <a:fld id="{4D55B308-DE3B-4AC4-B985-2D82C56D7FF1}" type="datetimeFigureOut">
               <a:rPr lang="pt-BR" smtClean="0"/>
-              <a:t>16/02/2021</a:t>
+              <a:t>17/02/2021</a:t>
             </a:fld>
             <a:endParaRPr lang="pt-BR"/>
           </a:p>
@@ -6687,7 +6693,7 @@
           <a:p>
             <a:fld id="{4D55B308-DE3B-4AC4-B985-2D82C56D7FF1}" type="datetimeFigureOut">
               <a:rPr lang="pt-BR" smtClean="0"/>
-              <a:t>16/02/2021</a:t>
+              <a:t>17/02/2021</a:t>
             </a:fld>
             <a:endParaRPr lang="pt-BR"/>
           </a:p>
@@ -7096,7 +7102,7 @@
           <a:p>
             <a:fld id="{4D55B308-DE3B-4AC4-B985-2D82C56D7FF1}" type="datetimeFigureOut">
               <a:rPr lang="pt-BR" smtClean="0"/>
-              <a:t>16/02/2021</a:t>
+              <a:t>17/02/2021</a:t>
             </a:fld>
             <a:endParaRPr lang="pt-BR"/>
           </a:p>
@@ -7340,7 +7346,7 @@
           <a:p>
             <a:fld id="{4D55B308-DE3B-4AC4-B985-2D82C56D7FF1}" type="datetimeFigureOut">
               <a:rPr lang="pt-BR" smtClean="0"/>
-              <a:t>16/02/2021</a:t>
+              <a:t>17/02/2021</a:t>
             </a:fld>
             <a:endParaRPr lang="pt-BR"/>
           </a:p>
@@ -7810,6 +7816,85 @@
 </p:sld>
 </file>
 
+<file path=ppt/slides/slide10.xml><?xml version="1.0" encoding="utf-8"?>
+<p:sld xmlns:a="http://schemas.openxmlformats.org/drawingml/2006/main" xmlns:r="http://schemas.openxmlformats.org/officeDocument/2006/relationships" xmlns:p="http://schemas.openxmlformats.org/presentationml/2006/main">
+  <p:cSld>
+    <p:spTree>
+      <p:nvGrpSpPr>
+        <p:cNvPr id="1" name=""/>
+        <p:cNvGrpSpPr/>
+        <p:nvPr/>
+      </p:nvGrpSpPr>
+      <p:grpSpPr>
+        <a:xfrm>
+          <a:off x="0" y="0"/>
+          <a:ext cx="0" cy="0"/>
+          <a:chOff x="0" y="0"/>
+          <a:chExt cx="0" cy="0"/>
+        </a:xfrm>
+      </p:grpSpPr>
+      <p:sp>
+        <p:nvSpPr>
+          <p:cNvPr id="2" name="Título 1"/>
+          <p:cNvSpPr>
+            <a:spLocks noGrp="1"/>
+          </p:cNvSpPr>
+          <p:nvPr>
+            <p:ph type="title"/>
+          </p:nvPr>
+        </p:nvSpPr>
+        <p:spPr/>
+        <p:txBody>
+          <a:bodyPr/>
+          <a:lstStyle/>
+          <a:p>
+            <a:r>
+              <a:rPr lang="pt-BR" dirty="0" smtClean="0"/>
+              <a:t>Leiautes de tela</a:t>
+            </a:r>
+            <a:endParaRPr lang="pt-BR" dirty="0"/>
+          </a:p>
+        </p:txBody>
+      </p:sp>
+      <p:pic>
+        <p:nvPicPr>
+          <p:cNvPr id="4" name="Espaço Reservado para Conteúdo 3"/>
+          <p:cNvPicPr>
+            <a:picLocks noGrp="1" noChangeAspect="1"/>
+          </p:cNvPicPr>
+          <p:nvPr>
+            <p:ph idx="1"/>
+          </p:nvPr>
+        </p:nvPicPr>
+        <p:blipFill>
+          <a:blip r:embed="rId2"/>
+          <a:stretch>
+            <a:fillRect/>
+          </a:stretch>
+        </p:blipFill>
+        <p:spPr>
+          <a:xfrm>
+            <a:off x="828266" y="2336800"/>
+            <a:ext cx="9319443" cy="3598863"/>
+          </a:xfrm>
+          <a:prstGeom prst="rect">
+            <a:avLst/>
+          </a:prstGeom>
+        </p:spPr>
+      </p:pic>
+    </p:spTree>
+    <p:extLst>
+      <p:ext uri="{BB962C8B-B14F-4D97-AF65-F5344CB8AC3E}">
+        <p14:creationId xmlns:p14="http://schemas.microsoft.com/office/powerpoint/2010/main" val="2181099459"/>
+      </p:ext>
+    </p:extLst>
+  </p:cSld>
+  <p:clrMapOvr>
+    <a:masterClrMapping/>
+  </p:clrMapOvr>
+</p:sld>
+</file>
+
 <file path=ppt/slides/slide2.xml><?xml version="1.0" encoding="utf-8"?>
 <p:sld xmlns:a="http://schemas.openxmlformats.org/drawingml/2006/main" xmlns:r="http://schemas.openxmlformats.org/officeDocument/2006/relationships" xmlns:p="http://schemas.openxmlformats.org/presentationml/2006/main">
   <p:cSld>
@@ -8485,43 +8570,46 @@
           <a:lstStyle/>
           <a:p>
             <a:r>
+              <a:rPr lang="pt-BR" dirty="0" err="1" smtClean="0"/>
+              <a:t>Wireframe</a:t>
+            </a:r>
+            <a:endParaRPr lang="pt-BR" dirty="0"/>
+          </a:p>
+        </p:txBody>
+      </p:sp>
+      <p:sp>
+        <p:nvSpPr>
+          <p:cNvPr id="3" name="Espaço Reservado para Conteúdo 2"/>
+          <p:cNvSpPr>
+            <a:spLocks noGrp="1"/>
+          </p:cNvSpPr>
+          <p:nvPr>
+            <p:ph idx="1"/>
+          </p:nvPr>
+        </p:nvSpPr>
+        <p:spPr/>
+        <p:txBody>
+          <a:bodyPr/>
+          <a:lstStyle/>
+          <a:p>
+            <a:r>
               <a:rPr lang="pt-BR" dirty="0" smtClean="0"/>
-              <a:t>Leiautes de tela</a:t>
+              <a:t>Planejamento</a:t>
+            </a:r>
+          </a:p>
+          <a:p>
+            <a:r>
+              <a:rPr lang="pt-BR" dirty="0" smtClean="0"/>
+              <a:t>Ferramentas para Prototipagem</a:t>
             </a:r>
             <a:endParaRPr lang="pt-BR" dirty="0"/>
           </a:p>
         </p:txBody>
       </p:sp>
-      <p:pic>
-        <p:nvPicPr>
-          <p:cNvPr id="4" name="Espaço Reservado para Conteúdo 3"/>
-          <p:cNvPicPr>
-            <a:picLocks noGrp="1" noChangeAspect="1"/>
-          </p:cNvPicPr>
-          <p:nvPr>
-            <p:ph idx="1"/>
-          </p:nvPr>
-        </p:nvPicPr>
-        <p:blipFill>
-          <a:blip r:embed="rId2"/>
-          <a:stretch>
-            <a:fillRect/>
-          </a:stretch>
-        </p:blipFill>
-        <p:spPr>
-          <a:xfrm>
-            <a:off x="828266" y="2336800"/>
-            <a:ext cx="9319443" cy="3598863"/>
-          </a:xfrm>
-          <a:prstGeom prst="rect">
-            <a:avLst/>
-          </a:prstGeom>
-        </p:spPr>
-      </p:pic>
     </p:spTree>
     <p:extLst>
       <p:ext uri="{BB962C8B-B14F-4D97-AF65-F5344CB8AC3E}">
-        <p14:creationId xmlns:p14="http://schemas.microsoft.com/office/powerpoint/2010/main" val="2181099459"/>
+        <p14:creationId xmlns:p14="http://schemas.microsoft.com/office/powerpoint/2010/main" val="3423211981"/>
       </p:ext>
     </p:extLst>
   </p:cSld>
@@ -8565,7 +8653,11 @@
           <a:p>
             <a:r>
               <a:rPr lang="pt-BR" dirty="0" err="1" smtClean="0"/>
-              <a:t>Wireframe</a:t>
+              <a:t>Tags</a:t>
+            </a:r>
+            <a:r>
+              <a:rPr lang="pt-BR" dirty="0" smtClean="0"/>
+              <a:t> iniciais</a:t>
             </a:r>
             <a:endParaRPr lang="pt-BR" dirty="0"/>
           </a:p>
@@ -8583,19 +8675,186 @@
         </p:nvSpPr>
         <p:spPr/>
         <p:txBody>
-          <a:bodyPr/>
+          <a:bodyPr>
+            <a:normAutofit fontScale="62500" lnSpcReduction="20000"/>
+          </a:bodyPr>
           <a:lstStyle/>
           <a:p>
             <a:r>
+              <a:rPr lang="pt-BR" dirty="0"/>
+              <a:t>&lt;!DOCTYPE </a:t>
+            </a:r>
+            <a:r>
+              <a:rPr lang="pt-BR" dirty="0" err="1"/>
+              <a:t>html</a:t>
+            </a:r>
+            <a:r>
               <a:rPr lang="pt-BR" dirty="0" smtClean="0"/>
-              <a:t>Planejamento</a:t>
+              <a:t>&gt; Define que o arquivo é uma página da  internet</a:t>
             </a:r>
           </a:p>
           <a:p>
             <a:r>
               <a:rPr lang="pt-BR" dirty="0" smtClean="0"/>
-              <a:t>Ferramentas para Prototipagem</a:t>
-            </a:r>
+              <a:t>&lt;HTML&gt; Início da página – </a:t>
+            </a:r>
+            <a:r>
+              <a:rPr lang="pt-BR" dirty="0" err="1" smtClean="0"/>
+              <a:t>Tag</a:t>
+            </a:r>
+            <a:r>
+              <a:rPr lang="pt-BR" dirty="0" smtClean="0"/>
+              <a:t> principal</a:t>
+            </a:r>
+          </a:p>
+          <a:p>
+            <a:r>
+              <a:rPr lang="pt-BR" dirty="0" smtClean="0"/>
+              <a:t>&lt;HEAD&gt; Cabeçalho – Configurações da página</a:t>
+            </a:r>
+          </a:p>
+          <a:p>
+            <a:r>
+              <a:rPr lang="pt-BR" dirty="0" smtClean="0"/>
+              <a:t>&lt;TITLE&gt; Título que aparece na barra de títulos do navegador(Chrome)</a:t>
+            </a:r>
+          </a:p>
+          <a:p>
+            <a:r>
+              <a:rPr lang="pt-BR" dirty="0" smtClean="0"/>
+              <a:t>&lt;META </a:t>
+            </a:r>
+            <a:r>
+              <a:rPr lang="pt-BR" dirty="0" err="1" smtClean="0"/>
+              <a:t>charset</a:t>
+            </a:r>
+            <a:r>
+              <a:rPr lang="pt-BR" dirty="0" smtClean="0"/>
+              <a:t>=‘utf-8’&gt; Configura os caracteres (Acentos em Português)</a:t>
+            </a:r>
+          </a:p>
+          <a:p>
+            <a:r>
+              <a:rPr lang="pt-BR" dirty="0" smtClean="0"/>
+              <a:t>&lt;BODY&gt; Corpo da página, onde colocamos tudo que será exibido ao usuário final (Front-</a:t>
+            </a:r>
+            <a:r>
+              <a:rPr lang="pt-BR" dirty="0" err="1" smtClean="0"/>
+              <a:t>End</a:t>
+            </a:r>
+            <a:r>
+              <a:rPr lang="pt-BR" dirty="0" smtClean="0"/>
+              <a:t>).</a:t>
+            </a:r>
+          </a:p>
+          <a:p>
+            <a:r>
+              <a:rPr lang="pt-BR" dirty="0" smtClean="0"/>
+              <a:t>&lt;H1&gt;</a:t>
+            </a:r>
+            <a:r>
+              <a:rPr lang="pt-BR" dirty="0"/>
+              <a:t>&lt;</a:t>
+            </a:r>
+            <a:r>
+              <a:rPr lang="pt-BR" dirty="0" smtClean="0"/>
+              <a:t>H2&gt;..&lt;H5&gt; Títulos e subtítulos da página</a:t>
+            </a:r>
+          </a:p>
+          <a:p>
+            <a:r>
+              <a:rPr lang="pt-BR" dirty="0" smtClean="0"/>
+              <a:t>&lt;P&gt; Paragrafo</a:t>
+            </a:r>
+          </a:p>
+          <a:p>
+            <a:r>
+              <a:rPr lang="pt-BR" dirty="0" smtClean="0"/>
+              <a:t>&lt;center&gt; alinha qualquer objeto ou texto</a:t>
+            </a:r>
+          </a:p>
+          <a:p>
+            <a:r>
+              <a:rPr lang="pt-BR" dirty="0" smtClean="0"/>
+              <a:t>&lt;p </a:t>
+            </a:r>
+            <a:r>
+              <a:rPr lang="pt-BR" dirty="0" err="1" smtClean="0"/>
+              <a:t>align</a:t>
+            </a:r>
+            <a:r>
+              <a:rPr lang="pt-BR" dirty="0" smtClean="0"/>
+              <a:t>=‘center, </a:t>
+            </a:r>
+            <a:r>
+              <a:rPr lang="pt-BR" dirty="0" err="1" smtClean="0"/>
+              <a:t>rigth</a:t>
+            </a:r>
+            <a:r>
+              <a:rPr lang="pt-BR" dirty="0"/>
+              <a:t>,</a:t>
+            </a:r>
+            <a:r>
+              <a:rPr lang="pt-BR" dirty="0" smtClean="0"/>
+              <a:t> </a:t>
+            </a:r>
+            <a:r>
+              <a:rPr lang="pt-BR" dirty="0" err="1" smtClean="0"/>
+              <a:t>left</a:t>
+            </a:r>
+            <a:r>
+              <a:rPr lang="pt-BR" dirty="0" smtClean="0"/>
+              <a:t> ou </a:t>
+            </a:r>
+            <a:r>
+              <a:rPr lang="pt-BR" dirty="0" err="1" smtClean="0"/>
+              <a:t>justfy</a:t>
+            </a:r>
+            <a:r>
+              <a:rPr lang="pt-BR" dirty="0" smtClean="0"/>
+              <a:t>’&gt; alinha o conteúdo do parágrafo.</a:t>
+            </a:r>
+          </a:p>
+          <a:p>
+            <a:r>
+              <a:rPr lang="pt-BR" dirty="0" smtClean="0"/>
+              <a:t>&lt;</a:t>
+            </a:r>
+            <a:r>
+              <a:rPr lang="pt-BR" dirty="0" err="1" smtClean="0"/>
+              <a:t>font</a:t>
+            </a:r>
+            <a:r>
+              <a:rPr lang="pt-BR" dirty="0" smtClean="0"/>
+              <a:t> color </a:t>
+            </a:r>
+            <a:r>
+              <a:rPr lang="pt-BR" dirty="0" err="1" smtClean="0"/>
+              <a:t>size</a:t>
+            </a:r>
+            <a:r>
+              <a:rPr lang="pt-BR" dirty="0" smtClean="0"/>
+              <a:t> face&gt; Altera a cor, o tamanho e o estilo da fonte</a:t>
+            </a:r>
+          </a:p>
+          <a:p>
+            <a:r>
+              <a:rPr lang="pt-BR" dirty="0" smtClean="0"/>
+              <a:t>&lt;b&gt;&lt;i&gt;&lt;u&gt; Negrito, Itálico </a:t>
+            </a:r>
+            <a:r>
+              <a:rPr lang="pt-BR" smtClean="0"/>
+              <a:t>e Sublinhado</a:t>
+            </a:r>
+            <a:endParaRPr lang="pt-BR" dirty="0"/>
+          </a:p>
+          <a:p>
+            <a:endParaRPr lang="pt-BR" dirty="0"/>
+          </a:p>
+          <a:p>
+            <a:endParaRPr lang="pt-BR" dirty="0" smtClean="0"/>
+          </a:p>
+          <a:p>
             <a:endParaRPr lang="pt-BR" dirty="0"/>
           </a:p>
         </p:txBody>
@@ -8603,7 +8862,7 @@
     </p:spTree>
     <p:extLst>
       <p:ext uri="{BB962C8B-B14F-4D97-AF65-F5344CB8AC3E}">
-        <p14:creationId xmlns:p14="http://schemas.microsoft.com/office/powerpoint/2010/main" val="3423211981"/>
+        <p14:creationId xmlns:p14="http://schemas.microsoft.com/office/powerpoint/2010/main" val="3640663186"/>
       </p:ext>
     </p:extLst>
   </p:cSld>

</xml_diff>